<commit_message>
Removed Question Slide from presentation
</commit_message>
<xml_diff>
--- a/MIDPOINT PRESENTATION/MidPoint Presentation.pptx
+++ b/MIDPOINT PRESENTATION/MidPoint Presentation.pptx
@@ -12,7 +12,6 @@
     <p:sldId id="260" r:id="rId6"/>
     <p:sldId id="261" r:id="rId7"/>
     <p:sldId id="262" r:id="rId8"/>
-    <p:sldId id="263" r:id="rId9"/>
   </p:sldIdLst>
   <p:sldSz cx="12192000" cy="6858000"/>
   <p:notesSz cx="6858000" cy="9144000"/>
@@ -1622,7 +1621,7 @@
           <a:p>
             <a:fld id="{C6BABA15-83BA-4AA3-8E9C-F0941D662455}" type="datetimeFigureOut">
               <a:rPr lang="en-IE" smtClean="0"/>
-              <a:t>21/03/2021</a:t>
+              <a:t>22/03/2021</a:t>
             </a:fld>
             <a:endParaRPr lang="en-IE"/>
           </a:p>
@@ -1822,7 +1821,7 @@
           <a:p>
             <a:fld id="{C6BABA15-83BA-4AA3-8E9C-F0941D662455}" type="datetimeFigureOut">
               <a:rPr lang="en-IE" smtClean="0"/>
-              <a:t>21/03/2021</a:t>
+              <a:t>22/03/2021</a:t>
             </a:fld>
             <a:endParaRPr lang="en-IE"/>
           </a:p>
@@ -2032,7 +2031,7 @@
           <a:p>
             <a:fld id="{C6BABA15-83BA-4AA3-8E9C-F0941D662455}" type="datetimeFigureOut">
               <a:rPr lang="en-IE" smtClean="0"/>
-              <a:t>21/03/2021</a:t>
+              <a:t>22/03/2021</a:t>
             </a:fld>
             <a:endParaRPr lang="en-IE"/>
           </a:p>
@@ -2232,7 +2231,7 @@
           <a:p>
             <a:fld id="{C6BABA15-83BA-4AA3-8E9C-F0941D662455}" type="datetimeFigureOut">
               <a:rPr lang="en-IE" smtClean="0"/>
-              <a:t>21/03/2021</a:t>
+              <a:t>22/03/2021</a:t>
             </a:fld>
             <a:endParaRPr lang="en-IE"/>
           </a:p>
@@ -2508,7 +2507,7 @@
           <a:p>
             <a:fld id="{C6BABA15-83BA-4AA3-8E9C-F0941D662455}" type="datetimeFigureOut">
               <a:rPr lang="en-IE" smtClean="0"/>
-              <a:t>21/03/2021</a:t>
+              <a:t>22/03/2021</a:t>
             </a:fld>
             <a:endParaRPr lang="en-IE"/>
           </a:p>
@@ -2776,7 +2775,7 @@
           <a:p>
             <a:fld id="{C6BABA15-83BA-4AA3-8E9C-F0941D662455}" type="datetimeFigureOut">
               <a:rPr lang="en-IE" smtClean="0"/>
-              <a:t>21/03/2021</a:t>
+              <a:t>22/03/2021</a:t>
             </a:fld>
             <a:endParaRPr lang="en-IE"/>
           </a:p>
@@ -3191,7 +3190,7 @@
           <a:p>
             <a:fld id="{C6BABA15-83BA-4AA3-8E9C-F0941D662455}" type="datetimeFigureOut">
               <a:rPr lang="en-IE" smtClean="0"/>
-              <a:t>21/03/2021</a:t>
+              <a:t>22/03/2021</a:t>
             </a:fld>
             <a:endParaRPr lang="en-IE"/>
           </a:p>
@@ -3333,7 +3332,7 @@
           <a:p>
             <a:fld id="{C6BABA15-83BA-4AA3-8E9C-F0941D662455}" type="datetimeFigureOut">
               <a:rPr lang="en-IE" smtClean="0"/>
-              <a:t>21/03/2021</a:t>
+              <a:t>22/03/2021</a:t>
             </a:fld>
             <a:endParaRPr lang="en-IE"/>
           </a:p>
@@ -3446,7 +3445,7 @@
           <a:p>
             <a:fld id="{C6BABA15-83BA-4AA3-8E9C-F0941D662455}" type="datetimeFigureOut">
               <a:rPr lang="en-IE" smtClean="0"/>
-              <a:t>21/03/2021</a:t>
+              <a:t>22/03/2021</a:t>
             </a:fld>
             <a:endParaRPr lang="en-IE"/>
           </a:p>
@@ -3759,7 +3758,7 @@
           <a:p>
             <a:fld id="{C6BABA15-83BA-4AA3-8E9C-F0941D662455}" type="datetimeFigureOut">
               <a:rPr lang="en-IE" smtClean="0"/>
-              <a:t>21/03/2021</a:t>
+              <a:t>22/03/2021</a:t>
             </a:fld>
             <a:endParaRPr lang="en-IE"/>
           </a:p>
@@ -4048,7 +4047,7 @@
           <a:p>
             <a:fld id="{C6BABA15-83BA-4AA3-8E9C-F0941D662455}" type="datetimeFigureOut">
               <a:rPr lang="en-IE" smtClean="0"/>
-              <a:t>21/03/2021</a:t>
+              <a:t>22/03/2021</a:t>
             </a:fld>
             <a:endParaRPr lang="en-IE"/>
           </a:p>
@@ -4291,7 +4290,7 @@
           <a:p>
             <a:fld id="{C6BABA15-83BA-4AA3-8E9C-F0941D662455}" type="datetimeFigureOut">
               <a:rPr lang="en-IE" smtClean="0"/>
-              <a:t>21/03/2021</a:t>
+              <a:t>22/03/2021</a:t>
             </a:fld>
             <a:endParaRPr lang="en-IE"/>
           </a:p>
@@ -9991,160 +9990,6 @@
 </p:sld>
 </file>
 
-<file path=ppt/slides/slide8.xml><?xml version="1.0" encoding="utf-8"?>
-<p:sld xmlns:a="http://schemas.openxmlformats.org/drawingml/2006/main" xmlns:r="http://schemas.openxmlformats.org/officeDocument/2006/relationships" xmlns:p="http://schemas.openxmlformats.org/presentationml/2006/main">
-  <p:cSld>
-    <p:bg>
-      <p:bgPr>
-        <a:gradFill>
-          <a:gsLst>
-            <a:gs pos="16000">
-              <a:srgbClr val="7030A0"/>
-            </a:gs>
-            <a:gs pos="100000">
-              <a:schemeClr val="tx1"/>
-            </a:gs>
-          </a:gsLst>
-          <a:lin ang="5400000" scaled="1"/>
-        </a:gradFill>
-        <a:effectLst/>
-      </p:bgPr>
-    </p:bg>
-    <p:spTree>
-      <p:nvGrpSpPr>
-        <p:cNvPr id="1" name=""/>
-        <p:cNvGrpSpPr/>
-        <p:nvPr/>
-      </p:nvGrpSpPr>
-      <p:grpSpPr>
-        <a:xfrm>
-          <a:off x="0" y="0"/>
-          <a:ext cx="0" cy="0"/>
-          <a:chOff x="0" y="0"/>
-          <a:chExt cx="0" cy="0"/>
-        </a:xfrm>
-      </p:grpSpPr>
-      <p:sp>
-        <p:nvSpPr>
-          <p:cNvPr id="10" name="TextBox 9">
-            <a:extLst>
-              <a:ext uri="{FF2B5EF4-FFF2-40B4-BE49-F238E27FC236}">
-                <a16:creationId xmlns:a16="http://schemas.microsoft.com/office/drawing/2014/main" id="{F99860CF-E1AB-4390-BF76-9BB806C3FD49}"/>
-              </a:ext>
-            </a:extLst>
-          </p:cNvPr>
-          <p:cNvSpPr txBox="1"/>
-          <p:nvPr/>
-        </p:nvSpPr>
-        <p:spPr>
-          <a:xfrm>
-            <a:off x="4260375" y="1473958"/>
-            <a:ext cx="3671249" cy="1015663"/>
-          </a:xfrm>
-          <a:prstGeom prst="rect">
-            <a:avLst/>
-          </a:prstGeom>
-          <a:noFill/>
-        </p:spPr>
-        <p:txBody>
-          <a:bodyPr wrap="square" rtlCol="0">
-            <a:spAutoFit/>
-          </a:bodyPr>
-          <a:lstStyle/>
-          <a:p>
-            <a:r>
-              <a:rPr lang="en-IE" sz="6000" dirty="0">
-                <a:solidFill>
-                  <a:schemeClr val="bg1"/>
-                </a:solidFill>
-              </a:rPr>
-              <a:t>Questions?</a:t>
-            </a:r>
-          </a:p>
-        </p:txBody>
-      </p:sp>
-      <p:sp>
-        <p:nvSpPr>
-          <p:cNvPr id="11" name="TextBox 10">
-            <a:extLst>
-              <a:ext uri="{FF2B5EF4-FFF2-40B4-BE49-F238E27FC236}">
-                <a16:creationId xmlns:a16="http://schemas.microsoft.com/office/drawing/2014/main" id="{B04D49AB-D87D-40B6-89B1-F3174A9EA38F}"/>
-              </a:ext>
-            </a:extLst>
-          </p:cNvPr>
-          <p:cNvSpPr txBox="1"/>
-          <p:nvPr/>
-        </p:nvSpPr>
-        <p:spPr>
-          <a:xfrm>
-            <a:off x="846161" y="4353635"/>
-            <a:ext cx="1842448" cy="1200329"/>
-          </a:xfrm>
-          <a:prstGeom prst="rect">
-            <a:avLst/>
-          </a:prstGeom>
-          <a:noFill/>
-        </p:spPr>
-        <p:txBody>
-          <a:bodyPr wrap="square" rtlCol="0">
-            <a:spAutoFit/>
-          </a:bodyPr>
-          <a:lstStyle/>
-          <a:p>
-            <a:r>
-              <a:rPr lang="en-IE" dirty="0">
-                <a:solidFill>
-                  <a:schemeClr val="bg1"/>
-                </a:solidFill>
-              </a:rPr>
-              <a:t>Presented By: </a:t>
-            </a:r>
-          </a:p>
-          <a:p>
-            <a:r>
-              <a:rPr lang="en-IE" dirty="0">
-                <a:solidFill>
-                  <a:schemeClr val="bg1"/>
-                </a:solidFill>
-              </a:rPr>
-              <a:t>Shane Mulrooney </a:t>
-            </a:r>
-          </a:p>
-          <a:p>
-            <a:r>
-              <a:rPr lang="en-IE" dirty="0">
-                <a:solidFill>
-                  <a:schemeClr val="bg1"/>
-                </a:solidFill>
-              </a:rPr>
-              <a:t>Sean Fulton </a:t>
-            </a:r>
-          </a:p>
-          <a:p>
-            <a:r>
-              <a:rPr lang="en-IE" dirty="0">
-                <a:solidFill>
-                  <a:schemeClr val="bg1"/>
-                </a:solidFill>
-              </a:rPr>
-              <a:t>Cree Gunning.</a:t>
-            </a:r>
-          </a:p>
-        </p:txBody>
-      </p:sp>
-    </p:spTree>
-    <p:extLst>
-      <p:ext uri="{BB962C8B-B14F-4D97-AF65-F5344CB8AC3E}">
-        <p14:creationId xmlns:p14="http://schemas.microsoft.com/office/powerpoint/2010/main" val="2472883040"/>
-      </p:ext>
-    </p:extLst>
-  </p:cSld>
-  <p:clrMapOvr>
-    <a:masterClrMapping/>
-  </p:clrMapOvr>
-</p:sld>
-</file>
-
 <file path=ppt/theme/theme1.xml><?xml version="1.0" encoding="utf-8"?>
 <a:theme xmlns:a="http://schemas.openxmlformats.org/drawingml/2006/main" name="Office Theme">
   <a:themeElements>

</xml_diff>